<commit_message>
updated ray tracing actibity worksheet
</commit_message>
<xml_diff>
--- a/slides/pptx/week03.pptx
+++ b/slides/pptx/week03.pptx
@@ -9,6 +9,7 @@
     <p:sldId id="257" r:id="rId3"/>
     <p:sldId id="258" r:id="rId4"/>
     <p:sldId id="259" r:id="rId5"/>
+    <p:sldId id="260" r:id="rId6"/>
   </p:sldIdLst>
   <p:sldSz cx="12192000" cy="6858000"/>
   <p:notesSz cx="6858000" cy="9144000"/>
@@ -3572,7 +3573,7 @@
           <p:cNvPr id="2" name="Title 1">
             <a:extLst>
               <a:ext uri="{FF2B5EF4-FFF2-40B4-BE49-F238E27FC236}">
-                <a16:creationId xmlns:a16="http://schemas.microsoft.com/office/drawing/2014/main" id="{A961E8F3-2071-45E9-B9B2-2CC1494E6117}"/>
+                <a16:creationId xmlns:a16="http://schemas.microsoft.com/office/drawing/2014/main" id="{B9171DC7-83DC-4812-B6D6-720FD0903317}"/>
               </a:ext>
             </a:extLst>
           </p:cNvPr>
@@ -3583,12 +3584,7 @@
             <p:ph type="title"/>
           </p:nvPr>
         </p:nvSpPr>
-        <p:spPr>
-          <a:xfrm>
-            <a:off x="831850" y="1709738"/>
-            <a:ext cx="10515600" cy="2852737"/>
-          </a:xfrm>
-        </p:spPr>
+        <p:spPr/>
         <p:txBody>
           <a:bodyPr/>
           <a:lstStyle/>
@@ -3607,6 +3603,56 @@
             <a:r>
               <a:rPr/>
               <a:t>Tracing</a:t>
+            </a:r>
+          </a:p>
+        </p:txBody>
+      </p:sp>
+      <p:sp>
+        <p:nvSpPr>
+          <p:cNvPr id="3" name="Content Placeholder 2">
+            <a:extLst>
+              <a:ext uri="{FF2B5EF4-FFF2-40B4-BE49-F238E27FC236}">
+                <a16:creationId xmlns:a16="http://schemas.microsoft.com/office/drawing/2014/main" id="{E3951675-2757-4186-87D6-120677EA8D01}"/>
+              </a:ext>
+            </a:extLst>
+          </p:cNvPr>
+          <p:cNvSpPr>
+            <a:spLocks noGrp="1"/>
+          </p:cNvSpPr>
+          <p:nvPr>
+            <p:ph idx="1"/>
+          </p:nvPr>
+        </p:nvSpPr>
+        <p:spPr/>
+        <p:txBody>
+          <a:bodyPr/>
+          <a:lstStyle/>
+          <a:p>
+            <a:pPr lvl="1"/>
+            <a:r>
+              <a:rPr/>
+              <a:t>Essential Ray Tracing Algorithms</a:t>
+            </a:r>
+          </a:p>
+          <a:p>
+            <a:pPr lvl="1"/>
+            <a:r>
+              <a:rPr/>
+              <a:t>Ray-Surface Intersection Algorithms</a:t>
+            </a:r>
+          </a:p>
+          <a:p>
+            <a:pPr lvl="1"/>
+            <a:r>
+              <a:rPr/>
+              <a:t>Surface Physics</a:t>
+            </a:r>
+          </a:p>
+          <a:p>
+            <a:pPr lvl="1"/>
+            <a:r>
+              <a:rPr/>
+              <a:t>Realtime Ray Tracing</a:t>
             </a:r>
           </a:p>
         </p:txBody>
@@ -3706,6 +3752,108 @@
 </file>
 
 <file path=ppt/slides/slide4.xml><?xml version="1.0" encoding="utf-8"?>
+<p:sld xmlns:a="http://schemas.openxmlformats.org/drawingml/2006/main" xmlns:r="http://schemas.openxmlformats.org/officeDocument/2006/relationships" xmlns:p="http://schemas.openxmlformats.org/presentationml/2006/main">
+  <p:cSld>
+    <p:spTree>
+      <p:nvGrpSpPr>
+        <p:cNvPr id="1" name=""/>
+        <p:cNvGrpSpPr/>
+        <p:nvPr/>
+      </p:nvGrpSpPr>
+      <p:grpSpPr>
+        <a:xfrm>
+          <a:off x="0" y="0"/>
+          <a:ext cx="0" cy="0"/>
+          <a:chOff x="0" y="0"/>
+          <a:chExt cx="0" cy="0"/>
+        </a:xfrm>
+      </p:grpSpPr>
+      <p:sp>
+        <p:nvSpPr>
+          <p:cNvPr id="2" name="Title 1">
+            <a:extLst>
+              <a:ext uri="{FF2B5EF4-FFF2-40B4-BE49-F238E27FC236}">
+                <a16:creationId xmlns:a16="http://schemas.microsoft.com/office/drawing/2014/main" id="{B9171DC7-83DC-4812-B6D6-720FD0903317}"/>
+              </a:ext>
+            </a:extLst>
+          </p:cNvPr>
+          <p:cNvSpPr>
+            <a:spLocks noGrp="1"/>
+          </p:cNvSpPr>
+          <p:nvPr>
+            <p:ph type="title"/>
+          </p:nvPr>
+        </p:nvSpPr>
+        <p:spPr/>
+        <p:txBody>
+          <a:bodyPr/>
+          <a:lstStyle/>
+          <a:p>
+            <a:pPr lvl="0" marL="0" indent="0">
+              <a:buNone/>
+            </a:pPr>
+            <a:r>
+              <a:rPr/>
+              <a:t>Ray</a:t>
+            </a:r>
+            <a:r>
+              <a:rPr/>
+              <a:t> </a:t>
+            </a:r>
+            <a:r>
+              <a:rPr/>
+              <a:t>Tracing</a:t>
+            </a:r>
+            <a:r>
+              <a:rPr/>
+              <a:t> </a:t>
+            </a:r>
+            <a:r>
+              <a:rPr/>
+              <a:t>Shaders</a:t>
+            </a:r>
+          </a:p>
+        </p:txBody>
+      </p:sp>
+      <p:sp>
+        <p:nvSpPr>
+          <p:cNvPr id="3" name="Content Placeholder 2">
+            <a:extLst>
+              <a:ext uri="{FF2B5EF4-FFF2-40B4-BE49-F238E27FC236}">
+                <a16:creationId xmlns:a16="http://schemas.microsoft.com/office/drawing/2014/main" id="{E3951675-2757-4186-87D6-120677EA8D01}"/>
+              </a:ext>
+            </a:extLst>
+          </p:cNvPr>
+          <p:cNvSpPr>
+            <a:spLocks noGrp="1"/>
+          </p:cNvSpPr>
+          <p:nvPr>
+            <p:ph idx="1"/>
+          </p:nvPr>
+        </p:nvSpPr>
+        <p:spPr/>
+        <p:txBody>
+          <a:bodyPr/>
+          <a:lstStyle/>
+          <a:p>
+            <a:pPr lvl="0" marL="0" indent="0">
+              <a:buNone/>
+            </a:pPr>
+            <a:r>
+              <a:rPr sz="1800">
+                <a:latin typeface="Courier"/>
+              </a:rPr>
+              <a:t>latex {cmd=true hide=true} \documentclass{standalone} \usepackage{tikz} \usetikzlibrary{matrix} \begin{document} \begin{tikzpicture}   \matrix (m) [matrix of math nodes,row sep=3em,column sep=4em,minimum width=2em]   {      F &amp; B \\       &amp; A \\};   \path[-stealth]     (m-1-1) edge node [above] {$\beta$} (m-1-2)     (m-1-2) edge node [right] {$\rho$} (m-2-2)     (m-1-1) edge node [left] {$\alpha$} (m-2-2); \end{tikzpicture} \end{document}</a:t>
+            </a:r>
+          </a:p>
+        </p:txBody>
+      </p:sp>
+    </p:spTree>
+  </p:cSld>
+</p:sld>
+</file>
+
+<file path=ppt/slides/slide5.xml><?xml version="1.0" encoding="utf-8"?>
 <p:sld xmlns:a="http://schemas.openxmlformats.org/drawingml/2006/main" xmlns:r="http://schemas.openxmlformats.org/officeDocument/2006/relationships" xmlns:p="http://schemas.openxmlformats.org/presentationml/2006/main">
   <p:cSld>
     <p:spTree>

</xml_diff>

<commit_message>
Miss Shader and Sky Models Activity Worksheet
</commit_message>
<xml_diff>
--- a/slides/pptx/week03.pptx
+++ b/slides/pptx/week03.pptx
@@ -10,6 +10,7 @@
     <p:sldId id="258" r:id="rId4"/>
     <p:sldId id="259" r:id="rId5"/>
     <p:sldId id="260" r:id="rId6"/>
+    <p:sldId id="261" r:id="rId7"/>
   </p:sldIdLst>
   <p:sldSz cx="12192000" cy="6858000"/>
   <p:notesSz cx="6858000" cy="9144000"/>
@@ -3638,21 +3639,21 @@
             <a:pPr lvl="1"/>
             <a:r>
               <a:rPr/>
-              <a:t>Ray-Surface Intersection Algorithms</a:t>
+              <a:t>Ray Tracing Shaders</a:t>
             </a:r>
           </a:p>
           <a:p>
             <a:pPr lvl="1"/>
             <a:r>
               <a:rPr/>
-              <a:t>Surface Physics</a:t>
+              <a:t>Ray Intersection Algorithms</a:t>
             </a:r>
           </a:p>
           <a:p>
             <a:pPr lvl="1"/>
             <a:r>
               <a:rPr/>
-              <a:t>Realtime Ray Tracing</a:t>
+              <a:t>Ray Object Traversal</a:t>
             </a:r>
           </a:p>
         </p:txBody>
@@ -3705,7 +3706,23 @@
             </a:pPr>
             <a:r>
               <a:rPr/>
-              <a:t>Overview</a:t>
+              <a:t>Ray</a:t>
+            </a:r>
+            <a:r>
+              <a:rPr/>
+              <a:t> </a:t>
+            </a:r>
+            <a:r>
+              <a:rPr/>
+              <a:t>Tracing</a:t>
+            </a:r>
+            <a:r>
+              <a:rPr/>
+              <a:t> </a:t>
+            </a:r>
+            <a:r>
+              <a:rPr/>
+              <a:t>Shaders</a:t>
             </a:r>
           </a:p>
         </p:txBody>
@@ -3734,14 +3751,35 @@
             <a:pPr lvl="1"/>
             <a:r>
               <a:rPr/>
-              <a:t>Item 1</a:t>
+              <a:t>Ray Generation Shader</a:t>
             </a:r>
           </a:p>
           <a:p>
             <a:pPr lvl="1"/>
             <a:r>
               <a:rPr/>
-              <a:t>Item 2</a:t>
+              <a:t>Miss Shader</a:t>
+            </a:r>
+          </a:p>
+          <a:p>
+            <a:pPr lvl="1"/>
+            <a:r>
+              <a:rPr/>
+              <a:t>Closest Hit Shader</a:t>
+            </a:r>
+          </a:p>
+          <a:p>
+            <a:pPr lvl="1"/>
+            <a:r>
+              <a:rPr/>
+              <a:t>Any Hit Shader</a:t>
+            </a:r>
+          </a:p>
+          <a:p>
+            <a:pPr lvl="1"/>
+            <a:r>
+              <a:rPr/>
+              <a:t>Bounding Volume Hierarchy Processor</a:t>
             </a:r>
           </a:p>
         </p:txBody>
@@ -3802,7 +3840,7 @@
             </a:r>
             <a:r>
               <a:rPr/>
-              <a:t>Tracing</a:t>
+              <a:t>Intersection</a:t>
             </a:r>
             <a:r>
               <a:rPr/>
@@ -3810,7 +3848,7 @@
             </a:r>
             <a:r>
               <a:rPr/>
-              <a:t>Shaders</a:t>
+              <a:t>Algorithms</a:t>
             </a:r>
           </a:p>
         </p:txBody>
@@ -3836,14 +3874,17 @@
           <a:bodyPr/>
           <a:lstStyle/>
           <a:p>
-            <a:pPr lvl="0" marL="0" indent="0">
-              <a:buNone/>
-            </a:pPr>
-            <a:r>
-              <a:rPr sz="1800">
-                <a:latin typeface="Courier"/>
-              </a:rPr>
-              <a:t>latex {cmd=true hide=true} \documentclass{standalone} \usepackage{tikz} \usetikzlibrary{matrix} \begin{document} \begin{tikzpicture}   \matrix (m) [matrix of math nodes,row sep=3em,column sep=4em,minimum width=2em]   {      F &amp; B \\       &amp; A \\};   \path[-stealth]     (m-1-1) edge node [above] {$\beta$} (m-1-2)     (m-1-2) edge node [right] {$\rho$} (m-2-2)     (m-1-1) edge node [left] {$\alpha$} (m-2-2); \end{tikzpicture} \end{document}</a:t>
+            <a:pPr lvl="1"/>
+            <a:r>
+              <a:rPr/>
+              <a:t>Ray Sphere Intersection</a:t>
+            </a:r>
+          </a:p>
+          <a:p>
+            <a:pPr lvl="1"/>
+            <a:r>
+              <a:rPr/>
+              <a:t>Ray Plane Intersection</a:t>
             </a:r>
           </a:p>
         </p:txBody>
@@ -3854,6 +3895,118 @@
 </file>
 
 <file path=ppt/slides/slide5.xml><?xml version="1.0" encoding="utf-8"?>
+<p:sld xmlns:a="http://schemas.openxmlformats.org/drawingml/2006/main" xmlns:r="http://schemas.openxmlformats.org/officeDocument/2006/relationships" xmlns:p="http://schemas.openxmlformats.org/presentationml/2006/main">
+  <p:cSld>
+    <p:spTree>
+      <p:nvGrpSpPr>
+        <p:cNvPr id="1" name=""/>
+        <p:cNvGrpSpPr/>
+        <p:nvPr/>
+      </p:nvGrpSpPr>
+      <p:grpSpPr>
+        <a:xfrm>
+          <a:off x="0" y="0"/>
+          <a:ext cx="0" cy="0"/>
+          <a:chOff x="0" y="0"/>
+          <a:chExt cx="0" cy="0"/>
+        </a:xfrm>
+      </p:grpSpPr>
+      <p:sp>
+        <p:nvSpPr>
+          <p:cNvPr id="2" name="Title 1">
+            <a:extLst>
+              <a:ext uri="{FF2B5EF4-FFF2-40B4-BE49-F238E27FC236}">
+                <a16:creationId xmlns:a16="http://schemas.microsoft.com/office/drawing/2014/main" id="{B9171DC7-83DC-4812-B6D6-720FD0903317}"/>
+              </a:ext>
+            </a:extLst>
+          </p:cNvPr>
+          <p:cNvSpPr>
+            <a:spLocks noGrp="1"/>
+          </p:cNvSpPr>
+          <p:nvPr>
+            <p:ph type="title"/>
+          </p:nvPr>
+        </p:nvSpPr>
+        <p:spPr/>
+        <p:txBody>
+          <a:bodyPr/>
+          <a:lstStyle/>
+          <a:p>
+            <a:pPr lvl="0" marL="0" indent="0">
+              <a:buNone/>
+            </a:pPr>
+            <a:r>
+              <a:rPr/>
+              <a:t>Ray</a:t>
+            </a:r>
+            <a:r>
+              <a:rPr/>
+              <a:t> </a:t>
+            </a:r>
+            <a:r>
+              <a:rPr/>
+              <a:t>Object</a:t>
+            </a:r>
+            <a:r>
+              <a:rPr/>
+              <a:t> </a:t>
+            </a:r>
+            <a:r>
+              <a:rPr/>
+              <a:t>Traversal</a:t>
+            </a:r>
+          </a:p>
+        </p:txBody>
+      </p:sp>
+      <p:sp>
+        <p:nvSpPr>
+          <p:cNvPr id="3" name="Content Placeholder 2">
+            <a:extLst>
+              <a:ext uri="{FF2B5EF4-FFF2-40B4-BE49-F238E27FC236}">
+                <a16:creationId xmlns:a16="http://schemas.microsoft.com/office/drawing/2014/main" id="{E3951675-2757-4186-87D6-120677EA8D01}"/>
+              </a:ext>
+            </a:extLst>
+          </p:cNvPr>
+          <p:cNvSpPr>
+            <a:spLocks noGrp="1"/>
+          </p:cNvSpPr>
+          <p:nvPr>
+            <p:ph idx="1"/>
+          </p:nvPr>
+        </p:nvSpPr>
+        <p:spPr/>
+        <p:txBody>
+          <a:bodyPr/>
+          <a:lstStyle/>
+          <a:p>
+            <a:pPr lvl="0" marL="1270000" indent="0">
+              <a:buNone/>
+            </a:pPr>
+            <a:r>
+              <a:rPr sz="1800">
+                <a:latin typeface="Courier"/>
+              </a:rPr>
+              <a:t>h &lt;- HITRECORD(cur_t = tmax)
+Loop through object list
+    t &lt;- INTERSECT(ray, object)
+    IF t &lt; tmin THEN CONTINUE
+    IF t &gt; tmax THEN CONTINUE
+    IF t &gt; cur_t THEN CONTINUE
+    cur_t &lt;- t
+    ANYHIT_SHADER(h)
+END LOOP
+IF cur_t != tmax THEN CLOSEST_HIT_SHADER(h)
+ELSE MISS_SHADER(h)</a:t>
+            </a:r>
+          </a:p>
+        </p:txBody>
+      </p:sp>
+    </p:spTree>
+  </p:cSld>
+</p:sld>
+</file>
+
+<file path=ppt/slides/slide6.xml><?xml version="1.0" encoding="utf-8"?>
 <p:sld xmlns:a="http://schemas.openxmlformats.org/drawingml/2006/main" xmlns:r="http://schemas.openxmlformats.org/officeDocument/2006/relationships" xmlns:p="http://schemas.openxmlformats.org/presentationml/2006/main">
   <p:cSld>
     <p:spTree>

</xml_diff>